<commit_message>
add pic in readme
</commit_message>
<xml_diff>
--- a/2014201426/bot/BOT.pptx
+++ b/2014201426/bot/BOT.pptx
@@ -3069,7 +3069,7 @@
         </p:blipFill>
         <p:spPr>
           <a:xfrm>
-            <a:off x="2266950" y="2730500"/>
+            <a:off x="2200275" y="2708275"/>
             <a:ext cx="6924040" cy="3904615"/>
           </a:xfrm>
           <a:prstGeom prst="rect">
@@ -3111,7 +3111,7 @@
         </p:blipFill>
         <p:spPr>
           <a:xfrm>
-            <a:off x="2602865" y="1476375"/>
+            <a:off x="2602865" y="1521460"/>
             <a:ext cx="6924040" cy="3904615"/>
           </a:xfrm>
           <a:prstGeom prst="rect">
@@ -3164,7 +3164,6 @@
           <a:p>
             <a:r>
               <a:rPr lang="x-none" altLang="zh-CN" sz="3200">
-                <a:ln/>
                 <a:solidFill>
                   <a:schemeClr val="tx1"/>
                 </a:solidFill>
@@ -3179,7 +3178,6 @@
               <a:t>从测试结果中可以看出用development set finetune 所得到的模型更具有普适性，更能准确的描述测试集。</a:t>
             </a:r>
             <a:endParaRPr lang="x-none" altLang="zh-CN" sz="3200">
-              <a:ln/>
               <a:solidFill>
                 <a:schemeClr val="tx1"/>
               </a:solidFill>
@@ -3285,7 +3283,6 @@
           <a:p>
             <a:r>
               <a:rPr lang="x-none" altLang="zh-CN" sz="9600">
-                <a:ln/>
                 <a:solidFill>
                   <a:schemeClr val="accent1"/>
                 </a:solidFill>
@@ -3300,7 +3297,6 @@
               <a:t>thank you</a:t>
             </a:r>
             <a:endParaRPr lang="x-none" altLang="zh-CN" sz="9600">
-              <a:ln/>
               <a:solidFill>
                 <a:schemeClr val="accent1"/>
               </a:solidFill>
@@ -3823,7 +3819,7 @@
         </p:blipFill>
         <p:spPr>
           <a:xfrm>
-            <a:off x="739775" y="1063625"/>
+            <a:off x="739775" y="1085850"/>
             <a:ext cx="4257040" cy="4257040"/>
           </a:xfrm>
           <a:prstGeom prst="rect">

</xml_diff>